<commit_message>
update ROOT version number in schema
</commit_message>
<xml_diff>
--- a/Figs/VersionSchema.pptx
+++ b/Figs/VersionSchema.pptx
@@ -243,7 +243,7 @@
           <a:p>
             <a:fld id="{C8E381AD-670B-455F-AC68-511B14637EDD}" type="datetimeFigureOut">
               <a:rPr lang="en-US" smtClean="0"/>
-              <a:t>18/4/2016</a:t>
+              <a:t>28/4/2016</a:t>
             </a:fld>
             <a:endParaRPr lang="en-US"/>
           </a:p>
@@ -413,7 +413,7 @@
           <a:p>
             <a:fld id="{C8E381AD-670B-455F-AC68-511B14637EDD}" type="datetimeFigureOut">
               <a:rPr lang="en-US" smtClean="0"/>
-              <a:t>18/4/2016</a:t>
+              <a:t>28/4/2016</a:t>
             </a:fld>
             <a:endParaRPr lang="en-US"/>
           </a:p>
@@ -593,7 +593,7 @@
           <a:p>
             <a:fld id="{C8E381AD-670B-455F-AC68-511B14637EDD}" type="datetimeFigureOut">
               <a:rPr lang="en-US" smtClean="0"/>
-              <a:t>18/4/2016</a:t>
+              <a:t>28/4/2016</a:t>
             </a:fld>
             <a:endParaRPr lang="en-US"/>
           </a:p>
@@ -763,7 +763,7 @@
           <a:p>
             <a:fld id="{C8E381AD-670B-455F-AC68-511B14637EDD}" type="datetimeFigureOut">
               <a:rPr lang="en-US" smtClean="0"/>
-              <a:t>18/4/2016</a:t>
+              <a:t>28/4/2016</a:t>
             </a:fld>
             <a:endParaRPr lang="en-US"/>
           </a:p>
@@ -1009,7 +1009,7 @@
           <a:p>
             <a:fld id="{C8E381AD-670B-455F-AC68-511B14637EDD}" type="datetimeFigureOut">
               <a:rPr lang="en-US" smtClean="0"/>
-              <a:t>18/4/2016</a:t>
+              <a:t>28/4/2016</a:t>
             </a:fld>
             <a:endParaRPr lang="en-US"/>
           </a:p>
@@ -1241,7 +1241,7 @@
           <a:p>
             <a:fld id="{C8E381AD-670B-455F-AC68-511B14637EDD}" type="datetimeFigureOut">
               <a:rPr lang="en-US" smtClean="0"/>
-              <a:t>18/4/2016</a:t>
+              <a:t>28/4/2016</a:t>
             </a:fld>
             <a:endParaRPr lang="en-US"/>
           </a:p>
@@ -1608,7 +1608,7 @@
           <a:p>
             <a:fld id="{C8E381AD-670B-455F-AC68-511B14637EDD}" type="datetimeFigureOut">
               <a:rPr lang="en-US" smtClean="0"/>
-              <a:t>18/4/2016</a:t>
+              <a:t>28/4/2016</a:t>
             </a:fld>
             <a:endParaRPr lang="en-US"/>
           </a:p>
@@ -1726,7 +1726,7 @@
           <a:p>
             <a:fld id="{C8E381AD-670B-455F-AC68-511B14637EDD}" type="datetimeFigureOut">
               <a:rPr lang="en-US" smtClean="0"/>
-              <a:t>18/4/2016</a:t>
+              <a:t>28/4/2016</a:t>
             </a:fld>
             <a:endParaRPr lang="en-US"/>
           </a:p>
@@ -1821,7 +1821,7 @@
           <a:p>
             <a:fld id="{C8E381AD-670B-455F-AC68-511B14637EDD}" type="datetimeFigureOut">
               <a:rPr lang="en-US" smtClean="0"/>
-              <a:t>18/4/2016</a:t>
+              <a:t>28/4/2016</a:t>
             </a:fld>
             <a:endParaRPr lang="en-US"/>
           </a:p>
@@ -2098,7 +2098,7 @@
           <a:p>
             <a:fld id="{C8E381AD-670B-455F-AC68-511B14637EDD}" type="datetimeFigureOut">
               <a:rPr lang="en-US" smtClean="0"/>
-              <a:t>18/4/2016</a:t>
+              <a:t>28/4/2016</a:t>
             </a:fld>
             <a:endParaRPr lang="en-US"/>
           </a:p>
@@ -2355,7 +2355,7 @@
           <a:p>
             <a:fld id="{C8E381AD-670B-455F-AC68-511B14637EDD}" type="datetimeFigureOut">
               <a:rPr lang="en-US" smtClean="0"/>
-              <a:t>18/4/2016</a:t>
+              <a:t>28/4/2016</a:t>
             </a:fld>
             <a:endParaRPr lang="en-US"/>
           </a:p>
@@ -2568,7 +2568,7 @@
           <a:p>
             <a:fld id="{C8E381AD-670B-455F-AC68-511B14637EDD}" type="datetimeFigureOut">
               <a:rPr lang="en-US" smtClean="0"/>
-              <a:t>18/4/2016</a:t>
+              <a:t>28/4/2016</a:t>
             </a:fld>
             <a:endParaRPr lang="en-US"/>
           </a:p>
@@ -9702,16 +9702,16 @@
           <a:p>
             <a:pPr algn="ctr"/>
             <a:r>
-              <a:rPr lang="nl-NL" sz="1600" dirty="0" smtClean="0">
+              <a:rPr lang="nl-NL" sz="1600" b="1" dirty="0" smtClean="0">
                 <a:solidFill>
                   <a:schemeClr val="tx1"/>
                 </a:solidFill>
                 <a:latin typeface="Arial" panose="020B0604020202020204" pitchFamily="34" charset="0"/>
                 <a:cs typeface="Arial" panose="020B0604020202020204" pitchFamily="34" charset="0"/>
               </a:rPr>
-              <a:t>5.34.34</a:t>
-            </a:r>
-            <a:endParaRPr lang="nl-NL" sz="1600" dirty="0">
+              <a:t>5.34.36</a:t>
+            </a:r>
+            <a:endParaRPr lang="nl-NL" sz="1600" b="1" dirty="0">
               <a:solidFill>
                 <a:schemeClr val="tx1"/>
               </a:solidFill>

</xml_diff>

<commit_message>
Update version diagram and release notes
</commit_message>
<xml_diff>
--- a/Figs/VersionSchema.pptx
+++ b/Figs/VersionSchema.pptx
@@ -243,7 +243,7 @@
           <a:p>
             <a:fld id="{C8E381AD-670B-455F-AC68-511B14637EDD}" type="datetimeFigureOut">
               <a:rPr lang="en-US" smtClean="0"/>
-              <a:t>28/4/2016</a:t>
+              <a:t>3/5/2016</a:t>
             </a:fld>
             <a:endParaRPr lang="en-US"/>
           </a:p>
@@ -413,7 +413,7 @@
           <a:p>
             <a:fld id="{C8E381AD-670B-455F-AC68-511B14637EDD}" type="datetimeFigureOut">
               <a:rPr lang="en-US" smtClean="0"/>
-              <a:t>28/4/2016</a:t>
+              <a:t>3/5/2016</a:t>
             </a:fld>
             <a:endParaRPr lang="en-US"/>
           </a:p>
@@ -593,7 +593,7 @@
           <a:p>
             <a:fld id="{C8E381AD-670B-455F-AC68-511B14637EDD}" type="datetimeFigureOut">
               <a:rPr lang="en-US" smtClean="0"/>
-              <a:t>28/4/2016</a:t>
+              <a:t>3/5/2016</a:t>
             </a:fld>
             <a:endParaRPr lang="en-US"/>
           </a:p>
@@ -763,7 +763,7 @@
           <a:p>
             <a:fld id="{C8E381AD-670B-455F-AC68-511B14637EDD}" type="datetimeFigureOut">
               <a:rPr lang="en-US" smtClean="0"/>
-              <a:t>28/4/2016</a:t>
+              <a:t>3/5/2016</a:t>
             </a:fld>
             <a:endParaRPr lang="en-US"/>
           </a:p>
@@ -1009,7 +1009,7 @@
           <a:p>
             <a:fld id="{C8E381AD-670B-455F-AC68-511B14637EDD}" type="datetimeFigureOut">
               <a:rPr lang="en-US" smtClean="0"/>
-              <a:t>28/4/2016</a:t>
+              <a:t>3/5/2016</a:t>
             </a:fld>
             <a:endParaRPr lang="en-US"/>
           </a:p>
@@ -1241,7 +1241,7 @@
           <a:p>
             <a:fld id="{C8E381AD-670B-455F-AC68-511B14637EDD}" type="datetimeFigureOut">
               <a:rPr lang="en-US" smtClean="0"/>
-              <a:t>28/4/2016</a:t>
+              <a:t>3/5/2016</a:t>
             </a:fld>
             <a:endParaRPr lang="en-US"/>
           </a:p>
@@ -1608,7 +1608,7 @@
           <a:p>
             <a:fld id="{C8E381AD-670B-455F-AC68-511B14637EDD}" type="datetimeFigureOut">
               <a:rPr lang="en-US" smtClean="0"/>
-              <a:t>28/4/2016</a:t>
+              <a:t>3/5/2016</a:t>
             </a:fld>
             <a:endParaRPr lang="en-US"/>
           </a:p>
@@ -1726,7 +1726,7 @@
           <a:p>
             <a:fld id="{C8E381AD-670B-455F-AC68-511B14637EDD}" type="datetimeFigureOut">
               <a:rPr lang="en-US" smtClean="0"/>
-              <a:t>28/4/2016</a:t>
+              <a:t>3/5/2016</a:t>
             </a:fld>
             <a:endParaRPr lang="en-US"/>
           </a:p>
@@ -1821,7 +1821,7 @@
           <a:p>
             <a:fld id="{C8E381AD-670B-455F-AC68-511B14637EDD}" type="datetimeFigureOut">
               <a:rPr lang="en-US" smtClean="0"/>
-              <a:t>28/4/2016</a:t>
+              <a:t>3/5/2016</a:t>
             </a:fld>
             <a:endParaRPr lang="en-US"/>
           </a:p>
@@ -2098,7 +2098,7 @@
           <a:p>
             <a:fld id="{C8E381AD-670B-455F-AC68-511B14637EDD}" type="datetimeFigureOut">
               <a:rPr lang="en-US" smtClean="0"/>
-              <a:t>28/4/2016</a:t>
+              <a:t>3/5/2016</a:t>
             </a:fld>
             <a:endParaRPr lang="en-US"/>
           </a:p>
@@ -2355,7 +2355,7 @@
           <a:p>
             <a:fld id="{C8E381AD-670B-455F-AC68-511B14637EDD}" type="datetimeFigureOut">
               <a:rPr lang="en-US" smtClean="0"/>
-              <a:t>28/4/2016</a:t>
+              <a:t>3/5/2016</a:t>
             </a:fld>
             <a:endParaRPr lang="en-US"/>
           </a:p>
@@ -2568,7 +2568,7 @@
           <a:p>
             <a:fld id="{C8E381AD-670B-455F-AC68-511B14637EDD}" type="datetimeFigureOut">
               <a:rPr lang="en-US" smtClean="0"/>
-              <a:t>28/4/2016</a:t>
+              <a:t>3/5/2016</a:t>
             </a:fld>
             <a:endParaRPr lang="en-US"/>
           </a:p>
@@ -10235,7 +10235,7 @@
                 <a:latin typeface="Arial" panose="020B0604020202020204" pitchFamily="34" charset="0"/>
                 <a:cs typeface="Arial" panose="020B0604020202020204" pitchFamily="34" charset="0"/>
               </a:rPr>
-              <a:t>8.6.4</a:t>
+              <a:t>8.7.1</a:t>
             </a:r>
             <a:endParaRPr lang="nl-NL" sz="1600" b="1" dirty="0">
               <a:solidFill>

</xml_diff>